<commit_message>
WPF pptx aanpassing Demo mvvm added
</commit_message>
<xml_diff>
--- a/Cursus/CSharp-WPF.pptx
+++ b/Cursus/CSharp-WPF.pptx
@@ -238,7 +238,7 @@
           <a:p>
             <a:fld id="{0123E455-1A20-4F9D-AB8C-A6908B79F2B5}" type="datetimeFigureOut">
               <a:rPr lang="en-US" smtClean="0"/>
-              <a:t>5/26/2020</a:t>
+              <a:t>5/28/2020</a:t>
             </a:fld>
             <a:endParaRPr lang="en-US"/>
           </a:p>
@@ -652,7 +652,7 @@
           <a:p>
             <a:fld id="{A0E91A94-F19F-40CA-AA51-DB498FD38CEA}" type="datetimeFigureOut">
               <a:rPr lang="en-US" smtClean="0"/>
-              <a:t>5/26/2020</a:t>
+              <a:t>5/28/2020</a:t>
             </a:fld>
             <a:endParaRPr lang="en-US"/>
           </a:p>
@@ -850,7 +850,7 @@
           <a:p>
             <a:fld id="{A0E91A94-F19F-40CA-AA51-DB498FD38CEA}" type="datetimeFigureOut">
               <a:rPr lang="en-US" smtClean="0"/>
-              <a:t>5/26/2020</a:t>
+              <a:t>5/28/2020</a:t>
             </a:fld>
             <a:endParaRPr lang="en-US"/>
           </a:p>
@@ -1058,7 +1058,7 @@
           <a:p>
             <a:fld id="{A0E91A94-F19F-40CA-AA51-DB498FD38CEA}" type="datetimeFigureOut">
               <a:rPr lang="en-US" smtClean="0"/>
-              <a:t>5/26/2020</a:t>
+              <a:t>5/28/2020</a:t>
             </a:fld>
             <a:endParaRPr lang="en-US"/>
           </a:p>
@@ -1324,7 +1324,7 @@
           <a:p>
             <a:fld id="{A0E91A94-F19F-40CA-AA51-DB498FD38CEA}" type="datetimeFigureOut">
               <a:rPr lang="en-US" smtClean="0"/>
-              <a:t>5/26/2020</a:t>
+              <a:t>5/28/2020</a:t>
             </a:fld>
             <a:endParaRPr lang="en-US"/>
           </a:p>
@@ -1599,7 +1599,7 @@
           <a:p>
             <a:fld id="{A0E91A94-F19F-40CA-AA51-DB498FD38CEA}" type="datetimeFigureOut">
               <a:rPr lang="en-US" smtClean="0"/>
-              <a:t>5/26/2020</a:t>
+              <a:t>5/28/2020</a:t>
             </a:fld>
             <a:endParaRPr lang="en-US"/>
           </a:p>
@@ -1864,7 +1864,7 @@
           <a:p>
             <a:fld id="{A0E91A94-F19F-40CA-AA51-DB498FD38CEA}" type="datetimeFigureOut">
               <a:rPr lang="en-US" smtClean="0"/>
-              <a:t>5/26/2020</a:t>
+              <a:t>5/28/2020</a:t>
             </a:fld>
             <a:endParaRPr lang="en-US"/>
           </a:p>
@@ -2276,7 +2276,7 @@
           <a:p>
             <a:fld id="{A0E91A94-F19F-40CA-AA51-DB498FD38CEA}" type="datetimeFigureOut">
               <a:rPr lang="en-US" smtClean="0"/>
-              <a:t>5/26/2020</a:t>
+              <a:t>5/28/2020</a:t>
             </a:fld>
             <a:endParaRPr lang="en-US"/>
           </a:p>
@@ -2417,7 +2417,7 @@
           <a:p>
             <a:fld id="{A0E91A94-F19F-40CA-AA51-DB498FD38CEA}" type="datetimeFigureOut">
               <a:rPr lang="en-US" smtClean="0"/>
-              <a:t>5/26/2020</a:t>
+              <a:t>5/28/2020</a:t>
             </a:fld>
             <a:endParaRPr lang="en-US"/>
           </a:p>
@@ -2530,7 +2530,7 @@
           <a:p>
             <a:fld id="{A0E91A94-F19F-40CA-AA51-DB498FD38CEA}" type="datetimeFigureOut">
               <a:rPr lang="en-US" smtClean="0"/>
-              <a:t>5/26/2020</a:t>
+              <a:t>5/28/2020</a:t>
             </a:fld>
             <a:endParaRPr lang="en-US"/>
           </a:p>
@@ -2841,7 +2841,7 @@
           <a:p>
             <a:fld id="{A0E91A94-F19F-40CA-AA51-DB498FD38CEA}" type="datetimeFigureOut">
               <a:rPr lang="en-US" smtClean="0"/>
-              <a:t>5/26/2020</a:t>
+              <a:t>5/28/2020</a:t>
             </a:fld>
             <a:endParaRPr lang="en-US"/>
           </a:p>
@@ -3129,7 +3129,7 @@
           <a:p>
             <a:fld id="{A0E91A94-F19F-40CA-AA51-DB498FD38CEA}" type="datetimeFigureOut">
               <a:rPr lang="en-US" smtClean="0"/>
-              <a:t>5/26/2020</a:t>
+              <a:t>5/28/2020</a:t>
             </a:fld>
             <a:endParaRPr lang="en-US"/>
           </a:p>
@@ -3370,7 +3370,7 @@
           <a:p>
             <a:fld id="{A0E91A94-F19F-40CA-AA51-DB498FD38CEA}" type="datetimeFigureOut">
               <a:rPr lang="en-US" smtClean="0"/>
-              <a:t>5/26/2020</a:t>
+              <a:t>5/28/2020</a:t>
             </a:fld>
             <a:endParaRPr lang="en-US"/>
           </a:p>
@@ -18746,12 +18746,12 @@
           <a:chExt cx="0" cy="0"/>
         </a:xfrm>
       </p:grpSpPr>
-      <p:sp>
+      <p:sp useBgFill="1">
         <p:nvSpPr>
-          <p:cNvPr id="39" name="Rectangle 38">
+          <p:cNvPr id="60" name="Rectangle 59">
             <a:extLst>
               <a:ext uri="{FF2B5EF4-FFF2-40B4-BE49-F238E27FC236}">
-                <a16:creationId xmlns:a16="http://schemas.microsoft.com/office/drawing/2014/main" id="{7CA0DAA6-33B8-4A25-810D-2F4D816FB40E}"/>
+                <a16:creationId xmlns:a16="http://schemas.microsoft.com/office/drawing/2014/main" id="{0671A8AE-40A1-4631-A6B8-581AFF065482}"/>
               </a:ext>
               <a:ext uri="{C183D7F6-B498-43B3-948B-1728B52AA6E4}">
                 <adec:decorative xmlns:adec="http://schemas.microsoft.com/office/drawing/2017/decorative" val="1"/>
@@ -18769,19 +18769,229 @@
             </p:extLst>
           </p:nvPr>
         </p:nvSpPr>
-        <p:spPr bwMode="white">
+        <p:spPr>
           <a:xfrm>
             <a:off x="0" y="0"/>
-            <a:ext cx="4972594" cy="6858000"/>
+            <a:ext cx="12192000" cy="6858000"/>
+          </a:xfrm>
+          <a:prstGeom prst="rect">
+            <a:avLst/>
+          </a:prstGeom>
+          <a:ln>
+            <a:noFill/>
+          </a:ln>
+        </p:spPr>
+        <p:style>
+          <a:lnRef idx="2">
+            <a:schemeClr val="accent1">
+              <a:shade val="50000"/>
+            </a:schemeClr>
+          </a:lnRef>
+          <a:fillRef idx="1">
+            <a:schemeClr val="accent1"/>
+          </a:fillRef>
+          <a:effectRef idx="0">
+            <a:schemeClr val="accent1"/>
+          </a:effectRef>
+          <a:fontRef idx="minor">
+            <a:schemeClr val="lt1"/>
+          </a:fontRef>
+        </p:style>
+        <p:txBody>
+          <a:bodyPr rtlCol="0" anchor="ctr"/>
+          <a:lstStyle/>
+          <a:p>
+            <a:pPr algn="ctr"/>
+            <a:endParaRPr lang="en-US"/>
+          </a:p>
+        </p:txBody>
+      </p:sp>
+      <p:pic>
+        <p:nvPicPr>
+          <p:cNvPr id="5" name="Content Placeholder 4" descr="A chain link fence&#10;&#10;Description automatically generated">
+            <a:extLst>
+              <a:ext uri="{FF2B5EF4-FFF2-40B4-BE49-F238E27FC236}">
+                <a16:creationId xmlns:a16="http://schemas.microsoft.com/office/drawing/2014/main" id="{4E5C1F78-EC69-4E42-82BB-C1FA51B36441}"/>
+              </a:ext>
+            </a:extLst>
+          </p:cNvPr>
+          <p:cNvPicPr>
+            <a:picLocks noGrp="1" noChangeAspect="1"/>
+          </p:cNvPicPr>
+          <p:nvPr>
+            <p:ph idx="1"/>
+          </p:nvPr>
+        </p:nvPicPr>
+        <p:blipFill rotWithShape="1">
+          <a:blip r:embed="rId2">
+            <a:extLst>
+              <a:ext uri="{28A0092B-C50C-407E-A947-70E740481C1C}">
+                <a14:useLocalDpi xmlns:a14="http://schemas.microsoft.com/office/drawing/2010/main" val="0"/>
+              </a:ext>
+            </a:extLst>
+          </a:blip>
+          <a:srcRect t="20636" r="9092" b="7443"/>
+          <a:stretch/>
+        </p:blipFill>
+        <p:spPr>
+          <a:xfrm>
+            <a:off x="3523488" y="10"/>
+            <a:ext cx="8668512" cy="6857990"/>
+          </a:xfrm>
+          <a:prstGeom prst="rect">
+            <a:avLst/>
+          </a:prstGeom>
+        </p:spPr>
+      </p:pic>
+      <p:sp>
+        <p:nvSpPr>
+          <p:cNvPr id="62" name="Rectangle 61">
+            <a:extLst>
+              <a:ext uri="{FF2B5EF4-FFF2-40B4-BE49-F238E27FC236}">
+                <a16:creationId xmlns:a16="http://schemas.microsoft.com/office/drawing/2014/main" id="{AB58EF07-17C2-48CF-ABB0-EEF1F17CB8F0}"/>
+              </a:ext>
+              <a:ext uri="{C183D7F6-B498-43B3-948B-1728B52AA6E4}">
+                <adec:decorative xmlns:adec="http://schemas.microsoft.com/office/drawing/2017/decorative" val="1"/>
+              </a:ext>
+            </a:extLst>
+          </p:cNvPr>
+          <p:cNvSpPr>
+            <a:spLocks noGrp="1" noRot="1" noChangeAspect="1" noMove="1" noResize="1" noEditPoints="1" noAdjustHandles="1" noChangeArrowheads="1" noChangeShapeType="1" noTextEdit="1"/>
+          </p:cNvSpPr>
+          <p:nvPr>
+            <p:extLst>
+              <p:ext uri="{386F3935-93C4-4BCD-93E2-E3B085C9AB24}">
+                <p16:designElem xmlns:p16="http://schemas.microsoft.com/office/powerpoint/2015/main" val="1"/>
+              </p:ext>
+            </p:extLst>
+          </p:nvPr>
+        </p:nvSpPr>
+        <p:spPr>
+          <a:xfrm>
+            <a:off x="3" y="0"/>
+            <a:ext cx="9339206" cy="6858000"/>
+          </a:xfrm>
+          <a:prstGeom prst="rect">
+            <a:avLst/>
+          </a:prstGeom>
+          <a:gradFill>
+            <a:gsLst>
+              <a:gs pos="58000">
+                <a:schemeClr val="bg1"/>
+              </a:gs>
+              <a:gs pos="33000">
+                <a:schemeClr val="bg1">
+                  <a:alpha val="64000"/>
+                </a:schemeClr>
+              </a:gs>
+              <a:gs pos="0">
+                <a:schemeClr val="bg1">
+                  <a:alpha val="0"/>
+                </a:schemeClr>
+              </a:gs>
+              <a:gs pos="100000">
+                <a:schemeClr val="bg1"/>
+              </a:gs>
+            </a:gsLst>
+            <a:lin ang="10800000" scaled="0"/>
+          </a:gradFill>
+          <a:ln>
+            <a:noFill/>
+          </a:ln>
+        </p:spPr>
+        <p:style>
+          <a:lnRef idx="2">
+            <a:schemeClr val="accent1">
+              <a:shade val="50000"/>
+            </a:schemeClr>
+          </a:lnRef>
+          <a:fillRef idx="1">
+            <a:schemeClr val="accent1"/>
+          </a:fillRef>
+          <a:effectRef idx="0">
+            <a:schemeClr val="accent1"/>
+          </a:effectRef>
+          <a:fontRef idx="minor">
+            <a:schemeClr val="lt1"/>
+          </a:fontRef>
+        </p:style>
+        <p:txBody>
+          <a:bodyPr rtlCol="0" anchor="ctr"/>
+          <a:lstStyle/>
+          <a:p>
+            <a:pPr algn="ctr"/>
+            <a:endParaRPr lang="en-US" dirty="0"/>
+          </a:p>
+        </p:txBody>
+      </p:sp>
+      <p:sp>
+        <p:nvSpPr>
+          <p:cNvPr id="2" name="Titel 1">
+            <a:extLst>
+              <a:ext uri="{FF2B5EF4-FFF2-40B4-BE49-F238E27FC236}">
+                <a16:creationId xmlns:a16="http://schemas.microsoft.com/office/drawing/2014/main" id="{C5670A04-1F4B-4E8C-82B2-B446AF1D161A}"/>
+              </a:ext>
+            </a:extLst>
+          </p:cNvPr>
+          <p:cNvSpPr>
+            <a:spLocks noGrp="1"/>
+          </p:cNvSpPr>
+          <p:nvPr>
+            <p:ph type="title"/>
+          </p:nvPr>
+        </p:nvSpPr>
+        <p:spPr>
+          <a:xfrm>
+            <a:off x="477981" y="1122363"/>
+            <a:ext cx="4023360" cy="3204134"/>
+          </a:xfrm>
+        </p:spPr>
+        <p:txBody>
+          <a:bodyPr vert="horz" lIns="91440" tIns="45720" rIns="91440" bIns="45720" rtlCol="0" anchor="b">
+            <a:normAutofit/>
+          </a:bodyPr>
+          <a:lstStyle/>
+          <a:p>
+            <a:r>
+              <a:rPr lang="en-US" sz="4800" b="1"/>
+              <a:t>Binding</a:t>
+            </a:r>
+          </a:p>
+        </p:txBody>
+      </p:sp>
+      <p:sp>
+        <p:nvSpPr>
+          <p:cNvPr id="64" name="Rectangle 63">
+            <a:extLst>
+              <a:ext uri="{FF2B5EF4-FFF2-40B4-BE49-F238E27FC236}">
+                <a16:creationId xmlns:a16="http://schemas.microsoft.com/office/drawing/2014/main" id="{AF2F604E-43BE-4DC3-B983-E071523364F8}"/>
+              </a:ext>
+              <a:ext uri="{C183D7F6-B498-43B3-948B-1728B52AA6E4}">
+                <adec:decorative xmlns:adec="http://schemas.microsoft.com/office/drawing/2017/decorative" val="1"/>
+              </a:ext>
+            </a:extLst>
+          </p:cNvPr>
+          <p:cNvSpPr>
+            <a:spLocks noGrp="1" noRot="1" noChangeAspect="1" noMove="1" noResize="1" noEditPoints="1" noAdjustHandles="1" noChangeArrowheads="1" noChangeShapeType="1" noTextEdit="1"/>
+          </p:cNvSpPr>
+          <p:nvPr>
+            <p:extLst>
+              <p:ext uri="{386F3935-93C4-4BCD-93E2-E3B085C9AB24}">
+                <p16:designElem xmlns:p16="http://schemas.microsoft.com/office/powerpoint/2015/main" val="1"/>
+              </p:ext>
+            </p:extLst>
+          </p:nvPr>
+        </p:nvSpPr>
+        <p:spPr>
+          <a:xfrm rot="5400000">
+            <a:off x="759921" y="346791"/>
+            <a:ext cx="146304" cy="704088"/>
           </a:xfrm>
           <a:prstGeom prst="rect">
             <a:avLst/>
           </a:prstGeom>
           <a:solidFill>
-            <a:schemeClr val="tx1">
-              <a:lumMod val="85000"/>
-              <a:lumOff val="15000"/>
-            </a:schemeClr>
+            <a:schemeClr val="accent2"/>
           </a:solidFill>
           <a:ln>
             <a:noFill/>
@@ -18808,81 +19018,108 @@
           <a:lstStyle/>
           <a:p>
             <a:pPr algn="ctr"/>
-            <a:endParaRPr lang="en-US"/>
+            <a:endParaRPr lang="en-US">
+              <a:solidFill>
+                <a:prstClr val="white"/>
+              </a:solidFill>
+              <a:latin typeface="Calibri" panose="020F0502020204030204"/>
+            </a:endParaRPr>
           </a:p>
         </p:txBody>
       </p:sp>
       <p:sp>
         <p:nvSpPr>
-          <p:cNvPr id="2" name="Titel 1">
+          <p:cNvPr id="66" name="Rectangle 65">
             <a:extLst>
               <a:ext uri="{FF2B5EF4-FFF2-40B4-BE49-F238E27FC236}">
-                <a16:creationId xmlns:a16="http://schemas.microsoft.com/office/drawing/2014/main" id="{C5670A04-1F4B-4E8C-82B2-B446AF1D161A}"/>
+                <a16:creationId xmlns:a16="http://schemas.microsoft.com/office/drawing/2014/main" id="{08C9B587-E65E-4B52-B37C-ABEBB6E87928}"/>
+              </a:ext>
+              <a:ext uri="{C183D7F6-B498-43B3-948B-1728B52AA6E4}">
+                <adec:decorative xmlns:adec="http://schemas.microsoft.com/office/drawing/2017/decorative" val="1"/>
               </a:ext>
             </a:extLst>
           </p:cNvPr>
           <p:cNvSpPr>
-            <a:spLocks noGrp="1"/>
+            <a:spLocks noGrp="1" noRot="1" noChangeAspect="1" noMove="1" noResize="1" noEditPoints="1" noAdjustHandles="1" noChangeArrowheads="1" noChangeShapeType="1" noTextEdit="1"/>
           </p:cNvSpPr>
           <p:nvPr>
-            <p:ph type="title"/>
+            <p:extLst>
+              <p:ext uri="{386F3935-93C4-4BCD-93E2-E3B085C9AB24}">
+                <p16:designElem xmlns:p16="http://schemas.microsoft.com/office/powerpoint/2015/main" val="1"/>
+              </p:ext>
+            </p:extLst>
           </p:nvPr>
         </p:nvSpPr>
         <p:spPr>
           <a:xfrm>
-            <a:off x="651307" y="640081"/>
-            <a:ext cx="3377183" cy="3681976"/>
-          </a:xfrm>
-          <a:noFill/>
-        </p:spPr>
-        <p:txBody>
-          <a:bodyPr vert="horz" lIns="91440" tIns="45720" rIns="91440" bIns="45720" rtlCol="0" anchor="b">
-            <a:normAutofit/>
-          </a:bodyPr>
-          <a:lstStyle/>
-          <a:p>
-            <a:r>
-              <a:rPr lang="en-US" b="1">
-                <a:solidFill>
-                  <a:schemeClr val="bg1"/>
-                </a:solidFill>
-              </a:rPr>
-              <a:t>Binding</a:t>
-            </a:r>
-          </a:p>
-        </p:txBody>
-      </p:sp>
-      <p:pic>
-        <p:nvPicPr>
-          <p:cNvPr id="5" name="Content Placeholder 4">
-            <a:extLst>
-              <a:ext uri="{FF2B5EF4-FFF2-40B4-BE49-F238E27FC236}">
-                <a16:creationId xmlns:a16="http://schemas.microsoft.com/office/drawing/2014/main" id="{4E5C1F78-EC69-4E42-82BB-C1FA51B36441}"/>
-              </a:ext>
-            </a:extLst>
-          </p:cNvPr>
-          <p:cNvPicPr>
-            <a:picLocks noGrp="1" noChangeAspect="1"/>
-          </p:cNvPicPr>
-          <p:nvPr>
-            <p:ph idx="1"/>
-          </p:nvPr>
-        </p:nvPicPr>
-        <p:blipFill rotWithShape="1">
-          <a:blip r:embed="rId2"/>
-          <a:srcRect t="9018" r="-1" b="-1"/>
-          <a:stretch/>
-        </p:blipFill>
-        <p:spPr>
-          <a:xfrm>
-            <a:off x="4654297" y="10"/>
-            <a:ext cx="7537704" cy="6857990"/>
+            <a:off x="481029" y="4546920"/>
+            <a:ext cx="3977640" cy="18288"/>
           </a:xfrm>
           <a:prstGeom prst="rect">
             <a:avLst/>
           </a:prstGeom>
+          <a:solidFill>
+            <a:schemeClr val="tx1"/>
+          </a:solidFill>
+          <a:ln w="3175">
+            <a:noFill/>
+          </a:ln>
+          <a:effectLst/>
         </p:spPr>
-      </p:pic>
+        <p:style>
+          <a:lnRef idx="2">
+            <a:schemeClr val="accent1">
+              <a:shade val="50000"/>
+            </a:schemeClr>
+          </a:lnRef>
+          <a:fillRef idx="1">
+            <a:schemeClr val="accent1"/>
+          </a:fillRef>
+          <a:effectRef idx="0">
+            <a:schemeClr val="accent1"/>
+          </a:effectRef>
+          <a:fontRef idx="minor">
+            <a:schemeClr val="lt1"/>
+          </a:fontRef>
+        </p:style>
+        <p:txBody>
+          <a:bodyPr rtlCol="0" anchor="ctr"/>
+          <a:lstStyle/>
+          <a:p>
+            <a:pPr marL="0" marR="0" lvl="0" indent="0" algn="ctr" defTabSz="914400" rtl="0" eaLnBrk="1" fontAlgn="auto" latinLnBrk="0" hangingPunct="1">
+              <a:lnSpc>
+                <a:spcPct val="100000"/>
+              </a:lnSpc>
+              <a:spcBef>
+                <a:spcPts val="0"/>
+              </a:spcBef>
+              <a:spcAft>
+                <a:spcPts val="0"/>
+              </a:spcAft>
+              <a:buClrTx/>
+              <a:buSzTx/>
+              <a:buFontTx/>
+              <a:buNone/>
+              <a:tabLst/>
+              <a:defRPr/>
+            </a:pPr>
+            <a:endParaRPr kumimoji="0" lang="en-US" sz="1800" b="0" i="0" u="none" strike="noStrike" kern="1200" cap="none" spc="0" normalizeH="0" baseline="0" noProof="0">
+              <a:ln>
+                <a:noFill/>
+              </a:ln>
+              <a:solidFill>
+                <a:prstClr val="white"/>
+              </a:solidFill>
+              <a:effectLst/>
+              <a:uLnTx/>
+              <a:uFillTx/>
+              <a:latin typeface="Calibri" panose="020F0502020204030204"/>
+              <a:ea typeface="+mn-ea"/>
+              <a:cs typeface="+mn-cs"/>
+            </a:endParaRPr>
+          </a:p>
+        </p:txBody>
+      </p:sp>
     </p:spTree>
     <p:extLst>
       <p:ext uri="{BB962C8B-B14F-4D97-AF65-F5344CB8AC3E}">
@@ -18891,7 +19128,7 @@
     </p:extLst>
   </p:cSld>
   <p:clrMapOvr>
-    <a:masterClrMapping/>
+    <a:overrideClrMapping bg1="dk1" tx1="lt1" bg2="dk2" tx2="lt2" accent1="accent1" accent2="accent2" accent3="accent3" accent4="accent4" accent5="accent5" accent6="accent6" hlink="hlink" folHlink="folHlink"/>
   </p:clrMapOvr>
 </p:sld>
 </file>
@@ -22561,9 +22798,10 @@
           <a:lstStyle/>
           <a:p>
             <a:r>
-              <a:rPr lang="nl-BE" dirty="0"/>
+              <a:rPr lang="nl-BE"/>
               <a:t>Data Binding</a:t>
             </a:r>
+            <a:endParaRPr lang="nl-BE" dirty="0"/>
           </a:p>
         </p:txBody>
       </p:sp>
@@ -22596,51 +22834,43 @@
           <a:lstStyle/>
           <a:p>
             <a:r>
-              <a:rPr lang="nl-BE" dirty="0"/>
+              <a:rPr lang="nl-BE"/>
               <a:t>Natuurlijk kunnen we de data uit data classes ook weergeven en bewerken in WPF door middel van data binding</a:t>
             </a:r>
           </a:p>
           <a:p>
             <a:r>
-              <a:rPr lang="nl-BE" dirty="0"/>
+              <a:rPr lang="nl-BE"/>
               <a:t>Een manier van werken is:</a:t>
             </a:r>
           </a:p>
           <a:p>
             <a:pPr lvl="1"/>
             <a:r>
-              <a:rPr lang="nl-BE" dirty="0"/>
+              <a:rPr lang="nl-BE"/>
               <a:t>Zorg voor een instantie van de te gebruiken data klas</a:t>
             </a:r>
           </a:p>
           <a:p>
             <a:pPr lvl="1"/>
             <a:r>
-              <a:rPr lang="nl-BE" dirty="0"/>
+              <a:rPr lang="nl-BE"/>
               <a:t>We kunnen in de </a:t>
             </a:r>
             <a:r>
-              <a:rPr lang="en-US" dirty="0"/>
+              <a:rPr lang="en-US"/>
               <a:t>code behind </a:t>
             </a:r>
             <a:r>
-              <a:rPr lang="nl-BE" dirty="0"/>
-              <a:t>de data klas instantie toekennen aan een overkoepelend WPF element (zoals bijvoorbeeld een </a:t>
-            </a:r>
-            <a:r>
-              <a:rPr lang="nl-BE" dirty="0" err="1"/>
-              <a:t>grid</a:t>
-            </a:r>
-            <a:r>
-              <a:rPr lang="nl-BE" dirty="0"/>
-              <a:t>). Dit doen we door de data klasse te binden via de </a:t>
-            </a:r>
-            <a:r>
-              <a:rPr lang="nl-BE" b="1" dirty="0" err="1"/>
+              <a:rPr lang="nl-BE"/>
+              <a:t>de data klas instantie toekennen aan een overkoepelend WPF element (zoals bijvoorbeeld een grid). Dit doen we door de data klasse te binden via de </a:t>
+            </a:r>
+            <a:r>
+              <a:rPr lang="nl-BE" b="1"/>
               <a:t>DataContext</a:t>
             </a:r>
             <a:r>
-              <a:rPr lang="nl-BE" dirty="0"/>
+              <a:rPr lang="nl-BE"/>
               <a:t> property in code:</a:t>
             </a:r>
           </a:p>
@@ -22649,35 +22879,19 @@
               <a:buNone/>
             </a:pPr>
             <a:r>
-              <a:rPr lang="nl-BE" b="1" dirty="0" err="1"/>
-              <a:t>myDataGrid.DataContext</a:t>
-            </a:r>
-            <a:r>
-              <a:rPr lang="nl-BE" b="1" dirty="0"/>
-              <a:t> = </a:t>
-            </a:r>
-            <a:r>
-              <a:rPr lang="nl-BE" b="1" dirty="0" err="1"/>
-              <a:t>myDataObject</a:t>
-            </a:r>
-            <a:r>
-              <a:rPr lang="nl-BE" dirty="0"/>
+              <a:rPr lang="nl-BE" b="1"/>
+              <a:t>myDataGrid.DataContext = myDataObject</a:t>
+            </a:r>
+            <a:r>
+              <a:rPr lang="nl-BE"/>
               <a:t>;</a:t>
             </a:r>
           </a:p>
           <a:p>
             <a:pPr lvl="1"/>
             <a:r>
-              <a:rPr lang="nl-BE" dirty="0"/>
-              <a:t>In de XAML kunnen we dan alle velden koppelen aan de members van die data klas door te binden met </a:t>
-            </a:r>
-            <a:r>
-              <a:rPr lang="nl-BE" dirty="0" err="1"/>
-              <a:t>Path</a:t>
-            </a:r>
-            <a:r>
-              <a:rPr lang="nl-BE" dirty="0"/>
-              <a:t> dat naar het juiste property van de klas verwijst:</a:t>
+              <a:rPr lang="nl-BE"/>
+              <a:t>In de XAML kunnen we dan alle velden koppelen aan de members van die data klas door te binden met Path dat naar het juiste property van de klas verwijst:</a:t>
             </a:r>
           </a:p>
           <a:p>
@@ -22685,91 +22899,23 @@
               <a:buNone/>
             </a:pPr>
             <a:r>
-              <a:rPr lang="nl-BE" dirty="0"/>
-              <a:t>&lt;</a:t>
-            </a:r>
-            <a:r>
-              <a:rPr lang="nl-BE" dirty="0" err="1"/>
-              <a:t>TextBox</a:t>
-            </a:r>
-            <a:r>
-              <a:rPr lang="nl-BE" dirty="0"/>
-              <a:t> </a:t>
-            </a:r>
-            <a:r>
-              <a:rPr lang="nl-BE" dirty="0" err="1"/>
-              <a:t>Margin</a:t>
-            </a:r>
-            <a:r>
-              <a:rPr lang="nl-BE" dirty="0"/>
-              <a:t>="5" </a:t>
-            </a:r>
-            <a:r>
-              <a:rPr lang="nl-BE" dirty="0" err="1"/>
-              <a:t>Grid.Column</a:t>
-            </a:r>
-            <a:r>
-              <a:rPr lang="nl-BE" dirty="0"/>
-              <a:t>="1“ </a:t>
-            </a:r>
-            <a:r>
-              <a:rPr lang="nl-BE" b="1" dirty="0" err="1"/>
-              <a:t>Text</a:t>
-            </a:r>
-            <a:r>
-              <a:rPr lang="nl-BE" b="1" dirty="0"/>
-              <a:t>="{Binding </a:t>
-            </a:r>
-            <a:r>
-              <a:rPr lang="nl-BE" b="1" dirty="0" err="1"/>
-              <a:t>Path</a:t>
-            </a:r>
-            <a:r>
-              <a:rPr lang="nl-BE" b="1" dirty="0"/>
-              <a:t>=</a:t>
-            </a:r>
-            <a:r>
-              <a:rPr lang="nl-BE" b="1" dirty="0" err="1"/>
-              <a:t>ModelName</a:t>
-            </a:r>
-            <a:r>
-              <a:rPr lang="nl-BE" b="1" dirty="0"/>
-              <a:t>}</a:t>
-            </a:r>
-            <a:r>
-              <a:rPr lang="nl-BE" dirty="0"/>
-              <a:t>"&gt;&lt;/</a:t>
-            </a:r>
-            <a:r>
-              <a:rPr lang="nl-BE" dirty="0" err="1"/>
-              <a:t>TextBox</a:t>
-            </a:r>
-            <a:r>
-              <a:rPr lang="nl-BE" dirty="0"/>
-              <a:t>&gt;</a:t>
+              <a:rPr lang="nl-BE"/>
+              <a:t>&lt;TextBox Margin="5" Grid.Column="1“ </a:t>
+            </a:r>
+            <a:r>
+              <a:rPr lang="nl-BE" b="1"/>
+              <a:t>Text="{Binding Path=ModelName}</a:t>
+            </a:r>
+            <a:r>
+              <a:rPr lang="nl-BE"/>
+              <a:t>"&gt;&lt;/TextBox&gt;</a:t>
             </a:r>
           </a:p>
           <a:p>
             <a:pPr lvl="1"/>
             <a:r>
-              <a:rPr lang="nl-BE" dirty="0"/>
-              <a:t>Om de data op te slaan kunnen we in de code (bijvoorbeeld in een save button click event) </a:t>
-            </a:r>
-            <a:r>
-              <a:rPr lang="nl-BE" dirty="0" err="1"/>
-              <a:t>dezelde</a:t>
-            </a:r>
-            <a:r>
-              <a:rPr lang="nl-BE" dirty="0"/>
-              <a:t> </a:t>
-            </a:r>
-            <a:r>
-              <a:rPr lang="nl-BE" dirty="0" err="1"/>
-              <a:t>DataContext</a:t>
-            </a:r>
-            <a:r>
-              <a:rPr lang="nl-BE" dirty="0"/>
-              <a:t> terug opvragen met de bijgewerkte velden</a:t>
+              <a:rPr lang="nl-BE"/>
+              <a:t>Om de data op te slaan kunnen we in de code (bijvoorbeeld in een save button click event) dezelde DataContext terug opvragen met de bijgewerkte velden</a:t>
             </a:r>
           </a:p>
           <a:p>
@@ -22777,41 +22923,17 @@
               <a:buNone/>
             </a:pPr>
             <a:r>
-              <a:rPr lang="nl-BE" b="1" dirty="0" err="1"/>
-              <a:t>MyDataClass</a:t>
-            </a:r>
-            <a:r>
-              <a:rPr lang="nl-BE" b="1" dirty="0"/>
-              <a:t> </a:t>
-            </a:r>
-            <a:r>
-              <a:rPr lang="nl-BE" b="1" dirty="0" err="1"/>
-              <a:t>myUpdatedData</a:t>
-            </a:r>
-            <a:r>
-              <a:rPr lang="nl-BE" b="1" dirty="0"/>
-              <a:t>= </a:t>
-            </a:r>
-            <a:r>
-              <a:rPr lang="nl-BE" b="1" dirty="0" err="1"/>
-              <a:t>myDataGrid.DataContext</a:t>
-            </a:r>
-            <a:r>
-              <a:rPr lang="nl-BE" b="1" dirty="0"/>
-              <a:t> as </a:t>
-            </a:r>
-            <a:r>
-              <a:rPr lang="nl-BE" b="1" dirty="0" err="1"/>
-              <a:t>MyDataClass</a:t>
-            </a:r>
-            <a:r>
-              <a:rPr lang="nl-BE" dirty="0"/>
+              <a:rPr lang="nl-BE" b="1"/>
+              <a:t>MyDataClass myUpdatedData= myDataGrid.DataContext as MyDataClass</a:t>
+            </a:r>
+            <a:r>
+              <a:rPr lang="nl-BE"/>
               <a:t>;</a:t>
             </a:r>
           </a:p>
           <a:p>
             <a:pPr lvl="1"/>
-            <a:endParaRPr lang="nl-BE" dirty="0"/>
+            <a:endParaRPr lang="nl-BE"/>
           </a:p>
           <a:p>
             <a:pPr lvl="3"/>
@@ -24376,10 +24498,10 @@
             </a:r>
           </a:p>
           <a:p>
-            <a:pPr lvl="1"/>
+            <a:pPr lvl="2"/>
             <a:r>
               <a:rPr lang="nl-BE" dirty="0"/>
-              <a:t>We kunnen daarna de </a:t>
+              <a:t>Pas wel op als je reeds een </a:t>
             </a:r>
             <a:r>
               <a:rPr lang="nl-BE" dirty="0" err="1"/>
@@ -24387,7 +24509,7 @@
             </a:r>
             <a:r>
               <a:rPr lang="nl-BE" dirty="0"/>
-              <a:t> gewoon teruggeven als een List aangezien </a:t>
+              <a:t> hebt gebonden aan elementen. Het maken van een nieuwe </a:t>
             </a:r>
             <a:r>
               <a:rPr lang="nl-BE" dirty="0" err="1"/>
@@ -24395,12 +24517,39 @@
             </a:r>
             <a:r>
               <a:rPr lang="nl-BE" dirty="0"/>
-              <a:t> zelf van een list is overgeërfd.</a:t>
+              <a:t> verbreekt te bestaande </a:t>
+            </a:r>
+            <a:r>
+              <a:rPr lang="nl-BE" dirty="0" err="1"/>
+              <a:t>bindings</a:t>
+            </a:r>
+            <a:r>
+              <a:rPr lang="nl-BE" dirty="0"/>
+              <a:t>.</a:t>
             </a:r>
           </a:p>
           <a:p>
             <a:pPr lvl="1"/>
-            <a:endParaRPr lang="nl-BE" dirty="0"/>
+            <a:r>
+              <a:rPr lang="nl-BE" dirty="0"/>
+              <a:t>Omdat we vaak items tussen List en </a:t>
+            </a:r>
+            <a:r>
+              <a:rPr lang="nl-BE" dirty="0" err="1"/>
+              <a:t>ObservableCollection</a:t>
+            </a:r>
+            <a:r>
+              <a:rPr lang="nl-BE" dirty="0"/>
+              <a:t> uitwisselen, is het aan te raden om hiervoor standaard extension </a:t>
+            </a:r>
+            <a:r>
+              <a:rPr lang="nl-BE" dirty="0" err="1"/>
+              <a:t>functions</a:t>
+            </a:r>
+            <a:r>
+              <a:rPr lang="nl-BE" dirty="0"/>
+              <a:t> te maken. </a:t>
+            </a:r>
           </a:p>
         </p:txBody>
       </p:sp>
@@ -24713,6 +24862,67 @@
                                           <p:spTgt spid="3">
                                             <p:txEl>
                                               <p:pRg st="4" end="4"/>
+                                            </p:txEl>
+                                          </p:spTgt>
+                                        </p:tgtEl>
+                                      </p:cBhvr>
+                                    </p:animEffect>
+                                  </p:childTnLst>
+                                </p:cTn>
+                              </p:par>
+                            </p:childTnLst>
+                          </p:cTn>
+                        </p:par>
+                      </p:childTnLst>
+                    </p:cTn>
+                  </p:par>
+                  <p:par>
+                    <p:cTn id="28" fill="hold">
+                      <p:stCondLst>
+                        <p:cond delay="indefinite"/>
+                      </p:stCondLst>
+                      <p:childTnLst>
+                        <p:par>
+                          <p:cTn id="29" fill="hold">
+                            <p:stCondLst>
+                              <p:cond delay="0"/>
+                            </p:stCondLst>
+                            <p:childTnLst>
+                              <p:par>
+                                <p:cTn id="30" presetID="10" presetClass="entr" presetSubtype="0" fill="hold" grpId="0" nodeType="clickEffect">
+                                  <p:stCondLst>
+                                    <p:cond delay="0"/>
+                                  </p:stCondLst>
+                                  <p:childTnLst>
+                                    <p:set>
+                                      <p:cBhvr>
+                                        <p:cTn id="31" dur="1" fill="hold">
+                                          <p:stCondLst>
+                                            <p:cond delay="0"/>
+                                          </p:stCondLst>
+                                        </p:cTn>
+                                        <p:tgtEl>
+                                          <p:spTgt spid="3">
+                                            <p:txEl>
+                                              <p:pRg st="5" end="5"/>
+                                            </p:txEl>
+                                          </p:spTgt>
+                                        </p:tgtEl>
+                                        <p:attrNameLst>
+                                          <p:attrName>style.visibility</p:attrName>
+                                        </p:attrNameLst>
+                                      </p:cBhvr>
+                                      <p:to>
+                                        <p:strVal val="visible"/>
+                                      </p:to>
+                                    </p:set>
+                                    <p:animEffect transition="in" filter="fade">
+                                      <p:cBhvr>
+                                        <p:cTn id="32" dur="500"/>
+                                        <p:tgtEl>
+                                          <p:spTgt spid="3">
+                                            <p:txEl>
+                                              <p:pRg st="5" end="5"/>
                                             </p:txEl>
                                           </p:spTgt>
                                         </p:tgtEl>

</xml_diff>